<commit_message>
Minor Changes and pdf format
</commit_message>
<xml_diff>
--- a/Briefings/Briefing10.pptx
+++ b/Briefings/Briefing10.pptx
@@ -20,8 +20,9 @@
     <p:sldId id="265" r:id="rId14"/>
     <p:sldId id="266" r:id="rId15"/>
     <p:sldId id="272" r:id="rId16"/>
-    <p:sldId id="267" r:id="rId17"/>
-    <p:sldId id="257" r:id="rId18"/>
+    <p:sldId id="273" r:id="rId17"/>
+    <p:sldId id="267" r:id="rId18"/>
+    <p:sldId id="257" r:id="rId19"/>
   </p:sldIdLst>
   <p:sldSz cx="9144000" cy="6858000" type="screen4x3"/>
   <p:notesSz cx="6858000" cy="9144000"/>
@@ -331,7 +332,7 @@
             <a:fld id="{542ED6D8-967B-4FDD-8539-23116DD8CE38}" type="datetimeFigureOut">
               <a:rPr lang="en-US" smtClean="0"/>
               <a:pPr/>
-              <a:t>2/21/2015</a:t>
+              <a:t>2/22/2015</a:t>
             </a:fld>
             <a:endParaRPr lang="en-US"/>
           </a:p>
@@ -527,7 +528,7 @@
             <a:fld id="{542ED6D8-967B-4FDD-8539-23116DD8CE38}" type="datetimeFigureOut">
               <a:rPr lang="en-US" smtClean="0"/>
               <a:pPr/>
-              <a:t>2/21/2015</a:t>
+              <a:t>2/22/2015</a:t>
             </a:fld>
             <a:endParaRPr lang="en-US"/>
           </a:p>
@@ -717,7 +718,7 @@
             <a:fld id="{542ED6D8-967B-4FDD-8539-23116DD8CE38}" type="datetimeFigureOut">
               <a:rPr lang="en-US" smtClean="0"/>
               <a:pPr/>
-              <a:t>2/21/2015</a:t>
+              <a:t>2/22/2015</a:t>
             </a:fld>
             <a:endParaRPr lang="en-US"/>
           </a:p>
@@ -948,7 +949,7 @@
             <a:fld id="{542ED6D8-967B-4FDD-8539-23116DD8CE38}" type="datetimeFigureOut">
               <a:rPr lang="en-US" smtClean="0"/>
               <a:pPr/>
-              <a:t>2/21/2015</a:t>
+              <a:t>2/22/2015</a:t>
             </a:fld>
             <a:endParaRPr lang="en-US"/>
           </a:p>
@@ -1231,7 +1232,7 @@
             <a:fld id="{542ED6D8-967B-4FDD-8539-23116DD8CE38}" type="datetimeFigureOut">
               <a:rPr lang="en-US" smtClean="0"/>
               <a:pPr/>
-              <a:t>2/21/2015</a:t>
+              <a:t>2/22/2015</a:t>
             </a:fld>
             <a:endParaRPr lang="en-US"/>
           </a:p>
@@ -1521,7 +1522,7 @@
             <a:fld id="{542ED6D8-967B-4FDD-8539-23116DD8CE38}" type="datetimeFigureOut">
               <a:rPr lang="en-US" smtClean="0"/>
               <a:pPr/>
-              <a:t>2/21/2015</a:t>
+              <a:t>2/22/2015</a:t>
             </a:fld>
             <a:endParaRPr lang="en-US"/>
           </a:p>
@@ -2077,7 +2078,7 @@
             <a:fld id="{542ED6D8-967B-4FDD-8539-23116DD8CE38}" type="datetimeFigureOut">
               <a:rPr lang="en-US" smtClean="0"/>
               <a:pPr/>
-              <a:t>2/21/2015</a:t>
+              <a:t>2/22/2015</a:t>
             </a:fld>
             <a:endParaRPr lang="en-US"/>
           </a:p>
@@ -2210,7 +2211,7 @@
             <a:fld id="{542ED6D8-967B-4FDD-8539-23116DD8CE38}" type="datetimeFigureOut">
               <a:rPr lang="en-US" smtClean="0"/>
               <a:pPr/>
-              <a:t>2/21/2015</a:t>
+              <a:t>2/22/2015</a:t>
             </a:fld>
             <a:endParaRPr lang="en-US"/>
           </a:p>
@@ -2362,7 +2363,7 @@
             <a:fld id="{542ED6D8-967B-4FDD-8539-23116DD8CE38}" type="datetimeFigureOut">
               <a:rPr lang="en-US" smtClean="0"/>
               <a:pPr/>
-              <a:t>2/21/2015</a:t>
+              <a:t>2/22/2015</a:t>
             </a:fld>
             <a:endParaRPr lang="en-US"/>
           </a:p>
@@ -2685,7 +2686,7 @@
             <a:fld id="{542ED6D8-967B-4FDD-8539-23116DD8CE38}" type="datetimeFigureOut">
               <a:rPr lang="en-US" smtClean="0"/>
               <a:pPr/>
-              <a:t>2/21/2015</a:t>
+              <a:t>2/22/2015</a:t>
             </a:fld>
             <a:endParaRPr lang="en-US"/>
           </a:p>
@@ -2984,7 +2985,7 @@
             <a:fld id="{542ED6D8-967B-4FDD-8539-23116DD8CE38}" type="datetimeFigureOut">
               <a:rPr lang="en-US" smtClean="0"/>
               <a:pPr/>
-              <a:t>2/21/2015</a:t>
+              <a:t>2/22/2015</a:t>
             </a:fld>
             <a:endParaRPr lang="en-US"/>
           </a:p>
@@ -3231,7 +3232,7 @@
             <a:fld id="{542ED6D8-967B-4FDD-8539-23116DD8CE38}" type="datetimeFigureOut">
               <a:rPr lang="en-US" smtClean="0"/>
               <a:pPr/>
-              <a:t>2/21/2015</a:t>
+              <a:t>2/22/2015</a:t>
             </a:fld>
             <a:endParaRPr lang="en-US"/>
           </a:p>
@@ -4283,13 +4284,15 @@
         </p:nvSpPr>
         <p:spPr/>
         <p:txBody>
-          <a:bodyPr/>
+          <a:bodyPr>
+            <a:normAutofit fontScale="90000"/>
+          </a:bodyPr>
           <a:lstStyle/>
           <a:p>
             <a:pPr algn="ctr"/>
             <a:r>
               <a:rPr lang="en-US" dirty="0" smtClean="0"/>
-              <a:t>Help Ending a Location</a:t>
+              <a:t>Help Editing/Deleting a Fish</a:t>
             </a:r>
             <a:endParaRPr lang="en-US" dirty="0"/>
           </a:p>
@@ -4297,7 +4300,7 @@
       </p:sp>
       <p:pic>
         <p:nvPicPr>
-          <p:cNvPr id="4" name="Content Placeholder 3" descr="Screenshot (56).png"/>
+          <p:cNvPr id="4" name="Content Placeholder 3" descr="Screenshot (65).png"/>
           <p:cNvPicPr>
             <a:picLocks noGrp="1" noChangeAspect="1"/>
           </p:cNvPicPr>
@@ -4327,6 +4330,78 @@
 </file>
 
 <file path=ppt/slides/slide17.xml><?xml version="1.0" encoding="utf-8"?>
+<p:sld xmlns:a="http://schemas.openxmlformats.org/drawingml/2006/main" xmlns:r="http://schemas.openxmlformats.org/officeDocument/2006/relationships" xmlns:p="http://schemas.openxmlformats.org/presentationml/2006/main">
+  <p:cSld>
+    <p:spTree>
+      <p:nvGrpSpPr>
+        <p:cNvPr id="1" name=""/>
+        <p:cNvGrpSpPr/>
+        <p:nvPr/>
+      </p:nvGrpSpPr>
+      <p:grpSpPr>
+        <a:xfrm>
+          <a:off x="0" y="0"/>
+          <a:ext cx="0" cy="0"/>
+          <a:chOff x="0" y="0"/>
+          <a:chExt cx="0" cy="0"/>
+        </a:xfrm>
+      </p:grpSpPr>
+      <p:sp>
+        <p:nvSpPr>
+          <p:cNvPr id="2" name="Title 1"/>
+          <p:cNvSpPr>
+            <a:spLocks noGrp="1"/>
+          </p:cNvSpPr>
+          <p:nvPr>
+            <p:ph type="title"/>
+          </p:nvPr>
+        </p:nvSpPr>
+        <p:spPr/>
+        <p:txBody>
+          <a:bodyPr/>
+          <a:lstStyle/>
+          <a:p>
+            <a:pPr algn="ctr"/>
+            <a:r>
+              <a:rPr lang="en-US" dirty="0" smtClean="0"/>
+              <a:t>Help Ending a Location</a:t>
+            </a:r>
+            <a:endParaRPr lang="en-US" dirty="0"/>
+          </a:p>
+        </p:txBody>
+      </p:sp>
+      <p:pic>
+        <p:nvPicPr>
+          <p:cNvPr id="4" name="Content Placeholder 3" descr="Screenshot (56).png"/>
+          <p:cNvPicPr>
+            <a:picLocks noGrp="1" noChangeAspect="1"/>
+          </p:cNvPicPr>
+          <p:nvPr>
+            <p:ph idx="1"/>
+          </p:nvPr>
+        </p:nvPicPr>
+        <p:blipFill>
+          <a:blip r:embed="rId2" cstate="print"/>
+          <a:stretch>
+            <a:fillRect/>
+          </a:stretch>
+        </p:blipFill>
+        <p:spPr>
+          <a:xfrm>
+            <a:off x="0" y="1447800"/>
+            <a:ext cx="9144000" cy="5410200"/>
+          </a:xfrm>
+        </p:spPr>
+      </p:pic>
+    </p:spTree>
+  </p:cSld>
+  <p:clrMapOvr>
+    <a:masterClrMapping/>
+  </p:clrMapOvr>
+</p:sld>
+</file>
+
+<file path=ppt/slides/slide18.xml><?xml version="1.0" encoding="utf-8"?>
 <p:sld xmlns:a="http://schemas.openxmlformats.org/drawingml/2006/main" xmlns:r="http://schemas.openxmlformats.org/officeDocument/2006/relationships" xmlns:p="http://schemas.openxmlformats.org/presentationml/2006/main">
   <p:cSld>
     <p:spTree>

</xml_diff>